<commit_message>
Architecture png and inside pttx update
</commit_message>
<xml_diff>
--- a/YANA_SpecificationDocument_v3.pptx
+++ b/YANA_SpecificationDocument_v3.pptx
@@ -23,6 +23,7 @@
     <p:sldId id="274" r:id="rId17"/>
     <p:sldId id="259" r:id="rId18"/>
     <p:sldId id="273" r:id="rId19"/>
+    <p:sldId id="275" r:id="rId20"/>
   </p:sldIdLst>
   <p:sldSz cx="12192000" cy="6858000"/>
   <p:notesSz cx="6858000" cy="9144000"/>
@@ -276,7 +277,7 @@
           <a:p>
             <a:fld id="{94B43D15-E77F-4644-B541-976CD44FBF9F}" type="datetimeFigureOut">
               <a:rPr lang="en-US" smtClean="0"/>
-              <a:t>4/12/2021</a:t>
+              <a:t>4/16/2021</a:t>
             </a:fld>
             <a:endParaRPr lang="en-US"/>
           </a:p>
@@ -474,7 +475,7 @@
           <a:p>
             <a:fld id="{94B43D15-E77F-4644-B541-976CD44FBF9F}" type="datetimeFigureOut">
               <a:rPr lang="en-US" smtClean="0"/>
-              <a:t>4/12/2021</a:t>
+              <a:t>4/16/2021</a:t>
             </a:fld>
             <a:endParaRPr lang="en-US"/>
           </a:p>
@@ -682,7 +683,7 @@
           <a:p>
             <a:fld id="{94B43D15-E77F-4644-B541-976CD44FBF9F}" type="datetimeFigureOut">
               <a:rPr lang="en-US" smtClean="0"/>
-              <a:t>4/12/2021</a:t>
+              <a:t>4/16/2021</a:t>
             </a:fld>
             <a:endParaRPr lang="en-US"/>
           </a:p>
@@ -880,7 +881,7 @@
           <a:p>
             <a:fld id="{94B43D15-E77F-4644-B541-976CD44FBF9F}" type="datetimeFigureOut">
               <a:rPr lang="en-US" smtClean="0"/>
-              <a:t>4/12/2021</a:t>
+              <a:t>4/16/2021</a:t>
             </a:fld>
             <a:endParaRPr lang="en-US"/>
           </a:p>
@@ -1155,7 +1156,7 @@
           <a:p>
             <a:fld id="{94B43D15-E77F-4644-B541-976CD44FBF9F}" type="datetimeFigureOut">
               <a:rPr lang="en-US" smtClean="0"/>
-              <a:t>4/12/2021</a:t>
+              <a:t>4/16/2021</a:t>
             </a:fld>
             <a:endParaRPr lang="en-US"/>
           </a:p>
@@ -1420,7 +1421,7 @@
           <a:p>
             <a:fld id="{94B43D15-E77F-4644-B541-976CD44FBF9F}" type="datetimeFigureOut">
               <a:rPr lang="en-US" smtClean="0"/>
-              <a:t>4/12/2021</a:t>
+              <a:t>4/16/2021</a:t>
             </a:fld>
             <a:endParaRPr lang="en-US"/>
           </a:p>
@@ -1832,7 +1833,7 @@
           <a:p>
             <a:fld id="{94B43D15-E77F-4644-B541-976CD44FBF9F}" type="datetimeFigureOut">
               <a:rPr lang="en-US" smtClean="0"/>
-              <a:t>4/12/2021</a:t>
+              <a:t>4/16/2021</a:t>
             </a:fld>
             <a:endParaRPr lang="en-US"/>
           </a:p>
@@ -1973,7 +1974,7 @@
           <a:p>
             <a:fld id="{94B43D15-E77F-4644-B541-976CD44FBF9F}" type="datetimeFigureOut">
               <a:rPr lang="en-US" smtClean="0"/>
-              <a:t>4/12/2021</a:t>
+              <a:t>4/16/2021</a:t>
             </a:fld>
             <a:endParaRPr lang="en-US"/>
           </a:p>
@@ -2086,7 +2087,7 @@
           <a:p>
             <a:fld id="{94B43D15-E77F-4644-B541-976CD44FBF9F}" type="datetimeFigureOut">
               <a:rPr lang="en-US" smtClean="0"/>
-              <a:t>4/12/2021</a:t>
+              <a:t>4/16/2021</a:t>
             </a:fld>
             <a:endParaRPr lang="en-US"/>
           </a:p>
@@ -2397,7 +2398,7 @@
           <a:p>
             <a:fld id="{94B43D15-E77F-4644-B541-976CD44FBF9F}" type="datetimeFigureOut">
               <a:rPr lang="en-US" smtClean="0"/>
-              <a:t>4/12/2021</a:t>
+              <a:t>4/16/2021</a:t>
             </a:fld>
             <a:endParaRPr lang="en-US"/>
           </a:p>
@@ -2685,7 +2686,7 @@
           <a:p>
             <a:fld id="{94B43D15-E77F-4644-B541-976CD44FBF9F}" type="datetimeFigureOut">
               <a:rPr lang="en-US" smtClean="0"/>
-              <a:t>4/12/2021</a:t>
+              <a:t>4/16/2021</a:t>
             </a:fld>
             <a:endParaRPr lang="en-US"/>
           </a:p>
@@ -2926,7 +2927,7 @@
           <a:p>
             <a:fld id="{94B43D15-E77F-4644-B541-976CD44FBF9F}" type="datetimeFigureOut">
               <a:rPr lang="en-US" smtClean="0"/>
-              <a:t>4/12/2021</a:t>
+              <a:t>4/16/2021</a:t>
             </a:fld>
             <a:endParaRPr lang="en-US"/>
           </a:p>
@@ -11962,6 +11963,832 @@
 </p:sld>
 </file>
 
+<file path=ppt/slides/slide19.xml><?xml version="1.0" encoding="utf-8"?>
+<p:sld xmlns:a="http://schemas.openxmlformats.org/drawingml/2006/main" xmlns:r="http://schemas.openxmlformats.org/officeDocument/2006/relationships" xmlns:p="http://schemas.openxmlformats.org/presentationml/2006/main">
+  <p:cSld>
+    <p:spTree>
+      <p:nvGrpSpPr>
+        <p:cNvPr id="1" name=""/>
+        <p:cNvGrpSpPr/>
+        <p:nvPr/>
+      </p:nvGrpSpPr>
+      <p:grpSpPr>
+        <a:xfrm>
+          <a:off x="0" y="0"/>
+          <a:ext cx="0" cy="0"/>
+          <a:chOff x="0" y="0"/>
+          <a:chExt cx="0" cy="0"/>
+        </a:xfrm>
+      </p:grpSpPr>
+      <p:sp>
+        <p:nvSpPr>
+          <p:cNvPr id="2" name="Title 1">
+            <a:extLst>
+              <a:ext uri="{FF2B5EF4-FFF2-40B4-BE49-F238E27FC236}">
+                <a16:creationId xmlns:a16="http://schemas.microsoft.com/office/drawing/2014/main" id="{F66FDA7B-271C-41AE-AC17-881C73426E79}"/>
+              </a:ext>
+            </a:extLst>
+          </p:cNvPr>
+          <p:cNvSpPr>
+            <a:spLocks noGrp="1"/>
+          </p:cNvSpPr>
+          <p:nvPr>
+            <p:ph type="title"/>
+          </p:nvPr>
+        </p:nvSpPr>
+        <p:spPr/>
+        <p:txBody>
+          <a:bodyPr>
+            <a:normAutofit/>
+          </a:bodyPr>
+          <a:lstStyle/>
+          <a:p>
+            <a:r>
+              <a:rPr lang="en-US" sz="5400" b="1" u="sng" dirty="0">
+                <a:effectLst>
+                  <a:outerShdw blurRad="38100" dist="38100" dir="2700000" algn="tl">
+                    <a:srgbClr val="000000">
+                      <a:alpha val="43137"/>
+                    </a:srgbClr>
+                  </a:outerShdw>
+                </a:effectLst>
+              </a:rPr>
+              <a:t>Architecture </a:t>
+            </a:r>
+          </a:p>
+        </p:txBody>
+      </p:sp>
+      <p:sp>
+        <p:nvSpPr>
+          <p:cNvPr id="4" name="Cube 3">
+            <a:extLst>
+              <a:ext uri="{FF2B5EF4-FFF2-40B4-BE49-F238E27FC236}">
+                <a16:creationId xmlns:a16="http://schemas.microsoft.com/office/drawing/2014/main" id="{B56AB0F1-D72C-4009-8209-89DD65993DA6}"/>
+              </a:ext>
+            </a:extLst>
+          </p:cNvPr>
+          <p:cNvSpPr/>
+          <p:nvPr/>
+        </p:nvSpPr>
+        <p:spPr>
+          <a:xfrm>
+            <a:off x="1097280" y="1589103"/>
+            <a:ext cx="2840707" cy="4098465"/>
+          </a:xfrm>
+          <a:prstGeom prst="cube">
+            <a:avLst>
+              <a:gd name="adj" fmla="val 13007"/>
+            </a:avLst>
+          </a:prstGeom>
+          <a:solidFill>
+            <a:schemeClr val="bg1">
+              <a:lumMod val="95000"/>
+              <a:alpha val="33000"/>
+            </a:schemeClr>
+          </a:solidFill>
+        </p:spPr>
+        <p:style>
+          <a:lnRef idx="2">
+            <a:schemeClr val="accent1">
+              <a:shade val="50000"/>
+            </a:schemeClr>
+          </a:lnRef>
+          <a:fillRef idx="1">
+            <a:schemeClr val="accent1"/>
+          </a:fillRef>
+          <a:effectRef idx="0">
+            <a:schemeClr val="accent1"/>
+          </a:effectRef>
+          <a:fontRef idx="minor">
+            <a:schemeClr val="lt1"/>
+          </a:fontRef>
+        </p:style>
+        <p:txBody>
+          <a:bodyPr rtlCol="0" anchor="ctr"/>
+          <a:lstStyle/>
+          <a:p>
+            <a:pPr algn="ctr"/>
+            <a:endParaRPr lang="en-US" dirty="0"/>
+          </a:p>
+        </p:txBody>
+      </p:sp>
+      <p:sp>
+        <p:nvSpPr>
+          <p:cNvPr id="6" name="Cylinder 5">
+            <a:extLst>
+              <a:ext uri="{FF2B5EF4-FFF2-40B4-BE49-F238E27FC236}">
+                <a16:creationId xmlns:a16="http://schemas.microsoft.com/office/drawing/2014/main" id="{B77B9033-6CF9-4FCB-846F-216BF781E91E}"/>
+              </a:ext>
+            </a:extLst>
+          </p:cNvPr>
+          <p:cNvSpPr/>
+          <p:nvPr/>
+        </p:nvSpPr>
+        <p:spPr>
+          <a:xfrm>
+            <a:off x="9108488" y="1589101"/>
+            <a:ext cx="2521259" cy="4098466"/>
+          </a:xfrm>
+          <a:prstGeom prst="can">
+            <a:avLst>
+              <a:gd name="adj" fmla="val 27817"/>
+            </a:avLst>
+          </a:prstGeom>
+          <a:solidFill>
+            <a:schemeClr val="bg1">
+              <a:lumMod val="95000"/>
+              <a:alpha val="33000"/>
+            </a:schemeClr>
+          </a:solidFill>
+        </p:spPr>
+        <p:style>
+          <a:lnRef idx="2">
+            <a:schemeClr val="accent1">
+              <a:shade val="50000"/>
+            </a:schemeClr>
+          </a:lnRef>
+          <a:fillRef idx="1">
+            <a:schemeClr val="accent1"/>
+          </a:fillRef>
+          <a:effectRef idx="0">
+            <a:schemeClr val="accent1"/>
+          </a:effectRef>
+          <a:fontRef idx="minor">
+            <a:schemeClr val="lt1"/>
+          </a:fontRef>
+        </p:style>
+        <p:txBody>
+          <a:bodyPr rtlCol="0" anchor="ctr"/>
+          <a:lstStyle/>
+          <a:p>
+            <a:pPr algn="ctr"/>
+            <a:endParaRPr lang="en-US"/>
+          </a:p>
+        </p:txBody>
+      </p:sp>
+      <p:sp>
+        <p:nvSpPr>
+          <p:cNvPr id="7" name="TextBox 6">
+            <a:extLst>
+              <a:ext uri="{FF2B5EF4-FFF2-40B4-BE49-F238E27FC236}">
+                <a16:creationId xmlns:a16="http://schemas.microsoft.com/office/drawing/2014/main" id="{80AAD6F3-440A-4D6A-9732-189A5434DFB6}"/>
+              </a:ext>
+            </a:extLst>
+          </p:cNvPr>
+          <p:cNvSpPr txBox="1"/>
+          <p:nvPr/>
+        </p:nvSpPr>
+        <p:spPr>
+          <a:xfrm>
+            <a:off x="1652725" y="1530502"/>
+            <a:ext cx="2566387" cy="461665"/>
+          </a:xfrm>
+          <a:prstGeom prst="rect">
+            <a:avLst/>
+          </a:prstGeom>
+          <a:noFill/>
+        </p:spPr>
+        <p:txBody>
+          <a:bodyPr wrap="square" rtlCol="0">
+            <a:spAutoFit/>
+          </a:bodyPr>
+          <a:lstStyle/>
+          <a:p>
+            <a:r>
+              <a:rPr lang="en-US" sz="2400" dirty="0">
+                <a:effectLst>
+                  <a:outerShdw blurRad="38100" dist="38100" dir="2700000" algn="tl">
+                    <a:srgbClr val="000000">
+                      <a:alpha val="43137"/>
+                    </a:srgbClr>
+                  </a:outerShdw>
+                </a:effectLst>
+              </a:rPr>
+              <a:t>Application</a:t>
+            </a:r>
+          </a:p>
+        </p:txBody>
+      </p:sp>
+      <p:sp>
+        <p:nvSpPr>
+          <p:cNvPr id="9" name="TextBox 8">
+            <a:extLst>
+              <a:ext uri="{FF2B5EF4-FFF2-40B4-BE49-F238E27FC236}">
+                <a16:creationId xmlns:a16="http://schemas.microsoft.com/office/drawing/2014/main" id="{0C14FE82-DD31-486B-BD01-4082E1479EC7}"/>
+              </a:ext>
+            </a:extLst>
+          </p:cNvPr>
+          <p:cNvSpPr txBox="1"/>
+          <p:nvPr/>
+        </p:nvSpPr>
+        <p:spPr>
+          <a:xfrm>
+            <a:off x="9479130" y="1748367"/>
+            <a:ext cx="1779974" cy="461665"/>
+          </a:xfrm>
+          <a:prstGeom prst="rect">
+            <a:avLst/>
+          </a:prstGeom>
+          <a:noFill/>
+        </p:spPr>
+        <p:txBody>
+          <a:bodyPr wrap="square" rtlCol="0">
+            <a:spAutoFit/>
+          </a:bodyPr>
+          <a:lstStyle/>
+          <a:p>
+            <a:r>
+              <a:rPr lang="en-US" sz="2400" dirty="0">
+                <a:effectLst>
+                  <a:outerShdw blurRad="38100" dist="38100" dir="2700000" algn="tl">
+                    <a:srgbClr val="000000">
+                      <a:alpha val="43137"/>
+                    </a:srgbClr>
+                  </a:outerShdw>
+                </a:effectLst>
+              </a:rPr>
+              <a:t>DB Firebase</a:t>
+            </a:r>
+          </a:p>
+        </p:txBody>
+      </p:sp>
+      <p:sp>
+        <p:nvSpPr>
+          <p:cNvPr id="10" name="Cube 9">
+            <a:extLst>
+              <a:ext uri="{FF2B5EF4-FFF2-40B4-BE49-F238E27FC236}">
+                <a16:creationId xmlns:a16="http://schemas.microsoft.com/office/drawing/2014/main" id="{8DD0A90A-7043-4E3E-8E19-0B9AFE23B85F}"/>
+              </a:ext>
+            </a:extLst>
+          </p:cNvPr>
+          <p:cNvSpPr/>
+          <p:nvPr/>
+        </p:nvSpPr>
+        <p:spPr>
+          <a:xfrm>
+            <a:off x="4949485" y="1589101"/>
+            <a:ext cx="3206964" cy="4098465"/>
+          </a:xfrm>
+          <a:prstGeom prst="cube">
+            <a:avLst>
+              <a:gd name="adj" fmla="val 12279"/>
+            </a:avLst>
+          </a:prstGeom>
+          <a:solidFill>
+            <a:schemeClr val="bg1">
+              <a:lumMod val="95000"/>
+              <a:alpha val="33000"/>
+            </a:schemeClr>
+          </a:solidFill>
+        </p:spPr>
+        <p:style>
+          <a:lnRef idx="2">
+            <a:schemeClr val="accent1">
+              <a:shade val="50000"/>
+            </a:schemeClr>
+          </a:lnRef>
+          <a:fillRef idx="1">
+            <a:schemeClr val="accent1"/>
+          </a:fillRef>
+          <a:effectRef idx="0">
+            <a:schemeClr val="accent1"/>
+          </a:effectRef>
+          <a:fontRef idx="minor">
+            <a:schemeClr val="lt1"/>
+          </a:fontRef>
+        </p:style>
+        <p:txBody>
+          <a:bodyPr rtlCol="0" anchor="ctr"/>
+          <a:lstStyle/>
+          <a:p>
+            <a:pPr algn="ctr"/>
+            <a:endParaRPr lang="en-US" dirty="0"/>
+          </a:p>
+        </p:txBody>
+      </p:sp>
+      <p:sp>
+        <p:nvSpPr>
+          <p:cNvPr id="11" name="TextBox 10">
+            <a:extLst>
+              <a:ext uri="{FF2B5EF4-FFF2-40B4-BE49-F238E27FC236}">
+                <a16:creationId xmlns:a16="http://schemas.microsoft.com/office/drawing/2014/main" id="{01A500CB-422F-45CE-A8FC-4073E8CE158C}"/>
+              </a:ext>
+            </a:extLst>
+          </p:cNvPr>
+          <p:cNvSpPr txBox="1"/>
+          <p:nvPr/>
+        </p:nvSpPr>
+        <p:spPr>
+          <a:xfrm>
+            <a:off x="5944709" y="1534071"/>
+            <a:ext cx="1438182" cy="461665"/>
+          </a:xfrm>
+          <a:prstGeom prst="rect">
+            <a:avLst/>
+          </a:prstGeom>
+          <a:noFill/>
+        </p:spPr>
+        <p:txBody>
+          <a:bodyPr wrap="square" rtlCol="0">
+            <a:spAutoFit/>
+          </a:bodyPr>
+          <a:lstStyle/>
+          <a:p>
+            <a:r>
+              <a:rPr lang="en-US" sz="2400" dirty="0">
+                <a:effectLst>
+                  <a:outerShdw blurRad="38100" dist="38100" dir="2700000" algn="tl">
+                    <a:srgbClr val="000000">
+                      <a:alpha val="43137"/>
+                    </a:srgbClr>
+                  </a:outerShdw>
+                </a:effectLst>
+              </a:rPr>
+              <a:t>Firebase</a:t>
+            </a:r>
+          </a:p>
+        </p:txBody>
+      </p:sp>
+      <p:sp>
+        <p:nvSpPr>
+          <p:cNvPr id="12" name="TextBox 11">
+            <a:extLst>
+              <a:ext uri="{FF2B5EF4-FFF2-40B4-BE49-F238E27FC236}">
+                <a16:creationId xmlns:a16="http://schemas.microsoft.com/office/drawing/2014/main" id="{11A97292-5E1A-49A3-8433-9AE375DF12D1}"/>
+              </a:ext>
+            </a:extLst>
+          </p:cNvPr>
+          <p:cNvSpPr txBox="1"/>
+          <p:nvPr/>
+        </p:nvSpPr>
+        <p:spPr>
+          <a:xfrm>
+            <a:off x="1097280" y="2152353"/>
+            <a:ext cx="2840707" cy="1477328"/>
+          </a:xfrm>
+          <a:prstGeom prst="rect">
+            <a:avLst/>
+          </a:prstGeom>
+          <a:noFill/>
+        </p:spPr>
+        <p:txBody>
+          <a:bodyPr wrap="square" rtlCol="0">
+            <a:spAutoFit/>
+          </a:bodyPr>
+          <a:lstStyle/>
+          <a:p>
+            <a:pPr marL="285750" indent="-285750">
+              <a:buFont typeface="Arial" panose="020B0604020202020204" pitchFamily="34" charset="0"/>
+              <a:buChar char="•"/>
+            </a:pPr>
+            <a:r>
+              <a:rPr lang="en-US" dirty="0"/>
+              <a:t>User Registration</a:t>
+            </a:r>
+          </a:p>
+          <a:p>
+            <a:pPr marL="285750" indent="-285750">
+              <a:buFont typeface="Arial" panose="020B0604020202020204" pitchFamily="34" charset="0"/>
+              <a:buChar char="•"/>
+            </a:pPr>
+            <a:r>
+              <a:rPr lang="en-US" dirty="0"/>
+              <a:t>User Login</a:t>
+            </a:r>
+          </a:p>
+          <a:p>
+            <a:pPr marL="285750" indent="-285750">
+              <a:buFont typeface="Arial" panose="020B0604020202020204" pitchFamily="34" charset="0"/>
+              <a:buChar char="•"/>
+            </a:pPr>
+            <a:r>
+              <a:rPr lang="en-US" dirty="0"/>
+              <a:t>Event Management</a:t>
+            </a:r>
+          </a:p>
+          <a:p>
+            <a:pPr marL="285750" indent="-285750">
+              <a:buFont typeface="Arial" panose="020B0604020202020204" pitchFamily="34" charset="0"/>
+              <a:buChar char="•"/>
+            </a:pPr>
+            <a:r>
+              <a:rPr lang="en-US" dirty="0"/>
+              <a:t>Chat Management</a:t>
+            </a:r>
+          </a:p>
+          <a:p>
+            <a:pPr marL="285750" indent="-285750">
+              <a:buFont typeface="Arial" panose="020B0604020202020204" pitchFamily="34" charset="0"/>
+              <a:buChar char="•"/>
+            </a:pPr>
+            <a:r>
+              <a:rPr lang="en-US" dirty="0"/>
+              <a:t>Bulletin Management</a:t>
+            </a:r>
+          </a:p>
+        </p:txBody>
+      </p:sp>
+      <p:sp>
+        <p:nvSpPr>
+          <p:cNvPr id="13" name="TextBox 12">
+            <a:extLst>
+              <a:ext uri="{FF2B5EF4-FFF2-40B4-BE49-F238E27FC236}">
+                <a16:creationId xmlns:a16="http://schemas.microsoft.com/office/drawing/2014/main" id="{5554859F-9460-485B-9439-79E8A48A4BAC}"/>
+              </a:ext>
+            </a:extLst>
+          </p:cNvPr>
+          <p:cNvSpPr txBox="1"/>
+          <p:nvPr/>
+        </p:nvSpPr>
+        <p:spPr>
+          <a:xfrm>
+            <a:off x="4949485" y="2152353"/>
+            <a:ext cx="3124667" cy="1754326"/>
+          </a:xfrm>
+          <a:prstGeom prst="rect">
+            <a:avLst/>
+          </a:prstGeom>
+          <a:noFill/>
+        </p:spPr>
+        <p:txBody>
+          <a:bodyPr wrap="square" rtlCol="0">
+            <a:spAutoFit/>
+          </a:bodyPr>
+          <a:lstStyle/>
+          <a:p>
+            <a:pPr marL="285750" indent="-285750">
+              <a:buFont typeface="Arial" panose="020B0604020202020204" pitchFamily="34" charset="0"/>
+              <a:buChar char="•"/>
+            </a:pPr>
+            <a:r>
+              <a:rPr lang="en-US" dirty="0"/>
+              <a:t>Database Management</a:t>
+            </a:r>
+          </a:p>
+          <a:p>
+            <a:pPr marL="285750" indent="-285750">
+              <a:buFont typeface="Arial" panose="020B0604020202020204" pitchFamily="34" charset="0"/>
+              <a:buChar char="•"/>
+            </a:pPr>
+            <a:r>
+              <a:rPr lang="en-US" dirty="0"/>
+              <a:t>User Management</a:t>
+            </a:r>
+          </a:p>
+          <a:p>
+            <a:pPr marL="742950" lvl="1" indent="-285750">
+              <a:buFont typeface="Arial" panose="020B0604020202020204" pitchFamily="34" charset="0"/>
+              <a:buChar char="•"/>
+            </a:pPr>
+            <a:r>
+              <a:rPr lang="en-US" dirty="0"/>
+              <a:t>Regular</a:t>
+            </a:r>
+          </a:p>
+          <a:p>
+            <a:pPr marL="742950" lvl="1" indent="-285750">
+              <a:buFont typeface="Arial" panose="020B0604020202020204" pitchFamily="34" charset="0"/>
+              <a:buChar char="•"/>
+            </a:pPr>
+            <a:r>
+              <a:rPr lang="en-US" dirty="0"/>
+              <a:t>Admin</a:t>
+            </a:r>
+          </a:p>
+          <a:p>
+            <a:pPr marL="285750" indent="-285750">
+              <a:buFont typeface="Arial" panose="020B0604020202020204" pitchFamily="34" charset="0"/>
+              <a:buChar char="•"/>
+            </a:pPr>
+            <a:r>
+              <a:rPr lang="en-US" dirty="0"/>
+              <a:t>Places Management</a:t>
+            </a:r>
+          </a:p>
+          <a:p>
+            <a:pPr marL="285750" indent="-285750">
+              <a:buFont typeface="Arial" panose="020B0604020202020204" pitchFamily="34" charset="0"/>
+              <a:buChar char="•"/>
+            </a:pPr>
+            <a:r>
+              <a:rPr lang="en-US" dirty="0"/>
+              <a:t>Notification Management</a:t>
+            </a:r>
+          </a:p>
+        </p:txBody>
+      </p:sp>
+      <p:sp>
+        <p:nvSpPr>
+          <p:cNvPr id="14" name="TextBox 13">
+            <a:extLst>
+              <a:ext uri="{FF2B5EF4-FFF2-40B4-BE49-F238E27FC236}">
+                <a16:creationId xmlns:a16="http://schemas.microsoft.com/office/drawing/2014/main" id="{87E4D401-FDA1-4C09-863B-91A6BA4A15EA}"/>
+              </a:ext>
+            </a:extLst>
+          </p:cNvPr>
+          <p:cNvSpPr txBox="1"/>
+          <p:nvPr/>
+        </p:nvSpPr>
+        <p:spPr>
+          <a:xfrm>
+            <a:off x="9145514" y="2345753"/>
+            <a:ext cx="2468703" cy="1477328"/>
+          </a:xfrm>
+          <a:prstGeom prst="rect">
+            <a:avLst/>
+          </a:prstGeom>
+          <a:noFill/>
+        </p:spPr>
+        <p:txBody>
+          <a:bodyPr wrap="square" rtlCol="0">
+            <a:spAutoFit/>
+          </a:bodyPr>
+          <a:lstStyle/>
+          <a:p>
+            <a:pPr marL="285750" indent="-285750">
+              <a:buFont typeface="Arial" panose="020B0604020202020204" pitchFamily="34" charset="0"/>
+              <a:buChar char="•"/>
+            </a:pPr>
+            <a:r>
+              <a:rPr lang="en-US" dirty="0"/>
+              <a:t>Stores </a:t>
+            </a:r>
+          </a:p>
+          <a:p>
+            <a:pPr marL="742950" lvl="1" indent="-285750">
+              <a:buFont typeface="Arial" panose="020B0604020202020204" pitchFamily="34" charset="0"/>
+              <a:buChar char="•"/>
+            </a:pPr>
+            <a:r>
+              <a:rPr lang="en-US" dirty="0"/>
+              <a:t>Users</a:t>
+            </a:r>
+          </a:p>
+          <a:p>
+            <a:pPr marL="742950" lvl="1" indent="-285750">
+              <a:buFont typeface="Arial" panose="020B0604020202020204" pitchFamily="34" charset="0"/>
+              <a:buChar char="•"/>
+            </a:pPr>
+            <a:r>
+              <a:rPr lang="en-US" dirty="0"/>
+              <a:t>Posts</a:t>
+            </a:r>
+          </a:p>
+          <a:p>
+            <a:pPr marL="742950" lvl="1" indent="-285750">
+              <a:buFont typeface="Arial" panose="020B0604020202020204" pitchFamily="34" charset="0"/>
+              <a:buChar char="•"/>
+            </a:pPr>
+            <a:r>
+              <a:rPr lang="en-US" dirty="0"/>
+              <a:t>Events</a:t>
+            </a:r>
+          </a:p>
+          <a:p>
+            <a:pPr marL="742950" lvl="1" indent="-285750">
+              <a:buFont typeface="Arial" panose="020B0604020202020204" pitchFamily="34" charset="0"/>
+              <a:buChar char="•"/>
+            </a:pPr>
+            <a:r>
+              <a:rPr lang="en-US" dirty="0"/>
+              <a:t>Places</a:t>
+            </a:r>
+          </a:p>
+        </p:txBody>
+      </p:sp>
+      <p:cxnSp>
+        <p:nvCxnSpPr>
+          <p:cNvPr id="20" name="Straight Arrow Connector 19">
+            <a:extLst>
+              <a:ext uri="{FF2B5EF4-FFF2-40B4-BE49-F238E27FC236}">
+                <a16:creationId xmlns:a16="http://schemas.microsoft.com/office/drawing/2014/main" id="{7F08F37E-767F-4123-81D0-A6E126211984}"/>
+              </a:ext>
+            </a:extLst>
+          </p:cNvPr>
+          <p:cNvCxnSpPr>
+            <a:cxnSpLocks/>
+            <a:stCxn id="4" idx="4"/>
+            <a:endCxn id="10" idx="2"/>
+          </p:cNvCxnSpPr>
+          <p:nvPr/>
+        </p:nvCxnSpPr>
+        <p:spPr>
+          <a:xfrm>
+            <a:off x="3568496" y="3823081"/>
+            <a:ext cx="1380989" cy="12144"/>
+          </a:xfrm>
+          <a:prstGeom prst="straightConnector1">
+            <a:avLst/>
+          </a:prstGeom>
+          <a:ln w="38100">
+            <a:solidFill>
+              <a:schemeClr val="tx1"/>
+            </a:solidFill>
+            <a:tailEnd type="triangle"/>
+          </a:ln>
+        </p:spPr>
+        <p:style>
+          <a:lnRef idx="1">
+            <a:schemeClr val="accent1"/>
+          </a:lnRef>
+          <a:fillRef idx="0">
+            <a:schemeClr val="accent1"/>
+          </a:fillRef>
+          <a:effectRef idx="0">
+            <a:schemeClr val="accent1"/>
+          </a:effectRef>
+          <a:fontRef idx="minor">
+            <a:schemeClr val="tx1"/>
+          </a:fontRef>
+        </p:style>
+      </p:cxnSp>
+      <p:sp>
+        <p:nvSpPr>
+          <p:cNvPr id="25" name="TextBox 24">
+            <a:extLst>
+              <a:ext uri="{FF2B5EF4-FFF2-40B4-BE49-F238E27FC236}">
+                <a16:creationId xmlns:a16="http://schemas.microsoft.com/office/drawing/2014/main" id="{F56F38DA-08BD-439F-B2DF-0C40BA79B6D2}"/>
+              </a:ext>
+            </a:extLst>
+          </p:cNvPr>
+          <p:cNvSpPr txBox="1"/>
+          <p:nvPr/>
+        </p:nvSpPr>
+        <p:spPr>
+          <a:xfrm>
+            <a:off x="4090253" y="3425950"/>
+            <a:ext cx="494046" cy="369332"/>
+          </a:xfrm>
+          <a:prstGeom prst="rect">
+            <a:avLst/>
+          </a:prstGeom>
+          <a:noFill/>
+        </p:spPr>
+        <p:txBody>
+          <a:bodyPr wrap="none" rtlCol="0">
+            <a:spAutoFit/>
+          </a:bodyPr>
+          <a:lstStyle/>
+          <a:p>
+            <a:r>
+              <a:rPr lang="en-US" dirty="0"/>
+              <a:t>API</a:t>
+            </a:r>
+          </a:p>
+        </p:txBody>
+      </p:sp>
+      <p:cxnSp>
+        <p:nvCxnSpPr>
+          <p:cNvPr id="27" name="Straight Arrow Connector 26">
+            <a:extLst>
+              <a:ext uri="{FF2B5EF4-FFF2-40B4-BE49-F238E27FC236}">
+                <a16:creationId xmlns:a16="http://schemas.microsoft.com/office/drawing/2014/main" id="{0CEBF581-C5F5-4E11-B9A5-512A01A47D3F}"/>
+              </a:ext>
+            </a:extLst>
+          </p:cNvPr>
+          <p:cNvCxnSpPr>
+            <a:cxnSpLocks/>
+            <a:stCxn id="10" idx="4"/>
+            <a:endCxn id="6" idx="2"/>
+          </p:cNvCxnSpPr>
+          <p:nvPr/>
+        </p:nvCxnSpPr>
+        <p:spPr>
+          <a:xfrm flipV="1">
+            <a:off x="7762666" y="3638334"/>
+            <a:ext cx="1345822" cy="196891"/>
+          </a:xfrm>
+          <a:prstGeom prst="straightConnector1">
+            <a:avLst/>
+          </a:prstGeom>
+          <a:ln w="38100">
+            <a:solidFill>
+              <a:schemeClr val="tx1"/>
+            </a:solidFill>
+            <a:tailEnd type="triangle"/>
+          </a:ln>
+        </p:spPr>
+        <p:style>
+          <a:lnRef idx="1">
+            <a:schemeClr val="accent1"/>
+          </a:lnRef>
+          <a:fillRef idx="0">
+            <a:schemeClr val="accent1"/>
+          </a:fillRef>
+          <a:effectRef idx="0">
+            <a:schemeClr val="accent1"/>
+          </a:effectRef>
+          <a:fontRef idx="minor">
+            <a:schemeClr val="tx1"/>
+          </a:fontRef>
+        </p:style>
+      </p:cxnSp>
+      <p:sp>
+        <p:nvSpPr>
+          <p:cNvPr id="28" name="TextBox 27">
+            <a:extLst>
+              <a:ext uri="{FF2B5EF4-FFF2-40B4-BE49-F238E27FC236}">
+                <a16:creationId xmlns:a16="http://schemas.microsoft.com/office/drawing/2014/main" id="{96D679BB-695A-4301-8816-A662797C4A93}"/>
+              </a:ext>
+            </a:extLst>
+          </p:cNvPr>
+          <p:cNvSpPr txBox="1"/>
+          <p:nvPr/>
+        </p:nvSpPr>
+        <p:spPr>
+          <a:xfrm>
+            <a:off x="8156449" y="3227462"/>
+            <a:ext cx="973536" cy="923330"/>
+          </a:xfrm>
+          <a:prstGeom prst="rect">
+            <a:avLst/>
+          </a:prstGeom>
+          <a:noFill/>
+        </p:spPr>
+        <p:txBody>
+          <a:bodyPr wrap="none" rtlCol="0">
+            <a:spAutoFit/>
+          </a:bodyPr>
+          <a:lstStyle/>
+          <a:p>
+            <a:r>
+              <a:rPr lang="en-US" dirty="0"/>
+              <a:t>Firebase</a:t>
+            </a:r>
+          </a:p>
+          <a:p>
+            <a:endParaRPr lang="en-US" dirty="0"/>
+          </a:p>
+          <a:p>
+            <a:r>
+              <a:rPr lang="en-US" dirty="0"/>
+              <a:t>internal</a:t>
+            </a:r>
+          </a:p>
+        </p:txBody>
+      </p:sp>
+      <p:sp>
+        <p:nvSpPr>
+          <p:cNvPr id="30" name="TextBox 29">
+            <a:extLst>
+              <a:ext uri="{FF2B5EF4-FFF2-40B4-BE49-F238E27FC236}">
+                <a16:creationId xmlns:a16="http://schemas.microsoft.com/office/drawing/2014/main" id="{A25AE6A2-16A8-4D56-8D48-41D8F26A5474}"/>
+              </a:ext>
+            </a:extLst>
+          </p:cNvPr>
+          <p:cNvSpPr txBox="1"/>
+          <p:nvPr/>
+        </p:nvSpPr>
+        <p:spPr>
+          <a:xfrm>
+            <a:off x="1097280" y="4945731"/>
+            <a:ext cx="2066544" cy="646331"/>
+          </a:xfrm>
+          <a:prstGeom prst="rect">
+            <a:avLst/>
+          </a:prstGeom>
+          <a:noFill/>
+        </p:spPr>
+        <p:txBody>
+          <a:bodyPr wrap="square" rtlCol="0">
+            <a:spAutoFit/>
+          </a:bodyPr>
+          <a:lstStyle/>
+          <a:p>
+            <a:pPr marL="285750" indent="-285750">
+              <a:buFont typeface="Wingdings" panose="05000000000000000000" pitchFamily="2" charset="2"/>
+              <a:buChar char="v"/>
+            </a:pPr>
+            <a:r>
+              <a:rPr lang="en-US" dirty="0"/>
+              <a:t>iOS</a:t>
+            </a:r>
+          </a:p>
+          <a:p>
+            <a:pPr marL="285750" indent="-285750">
+              <a:buFont typeface="Wingdings" panose="05000000000000000000" pitchFamily="2" charset="2"/>
+              <a:buChar char="v"/>
+            </a:pPr>
+            <a:r>
+              <a:rPr lang="en-US" dirty="0"/>
+              <a:t>Android</a:t>
+            </a:r>
+          </a:p>
+        </p:txBody>
+      </p:sp>
+    </p:spTree>
+    <p:extLst>
+      <p:ext uri="{BB962C8B-B14F-4D97-AF65-F5344CB8AC3E}">
+        <p14:creationId xmlns:p14="http://schemas.microsoft.com/office/powerpoint/2010/main" val="260076347"/>
+      </p:ext>
+    </p:extLst>
+  </p:cSld>
+  <p:clrMapOvr>
+    <a:masterClrMapping/>
+  </p:clrMapOvr>
+</p:sld>
+</file>
+
 <file path=ppt/slides/slide2.xml><?xml version="1.0" encoding="utf-8"?>
 <p:sld xmlns:a="http://schemas.openxmlformats.org/drawingml/2006/main" xmlns:r="http://schemas.openxmlformats.org/officeDocument/2006/relationships" xmlns:p="http://schemas.openxmlformats.org/presentationml/2006/main">
   <p:cSld>

</xml_diff>